<commit_message>
Last Update 29-08-2018 14:55:10.19
</commit_message>
<xml_diff>
--- a/Slides/Unit 2/CS8392-U2-String.pptx
+++ b/Slides/Unit 2/CS8392-U2-String.pptx
@@ -205,7 +205,7 @@
             <a:fld id="{9515075B-F3F0-4441-A1BD-B7B515B708FF}" type="datetimeFigureOut">
               <a:rPr lang="en-US" smtClean="0"/>
               <a:pPr/>
-              <a:t>8/12/2018</a:t>
+              <a:t>8/29/2018</a:t>
             </a:fld>
             <a:endParaRPr lang="en-US"/>
           </a:p>
@@ -660,7 +660,7 @@
             <a:fld id="{6E658DF8-B8C0-4C7F-85EB-B53A2DDD44A9}" type="datetimeFigureOut">
               <a:rPr lang="en-US" smtClean="0"/>
               <a:pPr/>
-              <a:t>8/12/2018</a:t>
+              <a:t>8/29/2018</a:t>
             </a:fld>
             <a:endParaRPr lang="en-US"/>
           </a:p>
@@ -827,7 +827,7 @@
             <a:fld id="{6E658DF8-B8C0-4C7F-85EB-B53A2DDD44A9}" type="datetimeFigureOut">
               <a:rPr lang="en-US" smtClean="0"/>
               <a:pPr/>
-              <a:t>8/12/2018</a:t>
+              <a:t>8/29/2018</a:t>
             </a:fld>
             <a:endParaRPr lang="en-US"/>
           </a:p>
@@ -1004,7 +1004,7 @@
             <a:fld id="{6E658DF8-B8C0-4C7F-85EB-B53A2DDD44A9}" type="datetimeFigureOut">
               <a:rPr lang="en-US" smtClean="0"/>
               <a:pPr/>
-              <a:t>8/12/2018</a:t>
+              <a:t>8/29/2018</a:t>
             </a:fld>
             <a:endParaRPr lang="en-US"/>
           </a:p>
@@ -1203,7 +1203,7 @@
             <a:fld id="{6E658DF8-B8C0-4C7F-85EB-B53A2DDD44A9}" type="datetimeFigureOut">
               <a:rPr lang="en-US" smtClean="0"/>
               <a:pPr/>
-              <a:t>8/12/2018</a:t>
+              <a:t>8/29/2018</a:t>
             </a:fld>
             <a:endParaRPr lang="en-US"/>
           </a:p>
@@ -1446,7 +1446,7 @@
             <a:fld id="{6E658DF8-B8C0-4C7F-85EB-B53A2DDD44A9}" type="datetimeFigureOut">
               <a:rPr lang="en-US" smtClean="0"/>
               <a:pPr/>
-              <a:t>8/12/2018</a:t>
+              <a:t>8/29/2018</a:t>
             </a:fld>
             <a:endParaRPr lang="en-US"/>
           </a:p>
@@ -1731,7 +1731,7 @@
             <a:fld id="{6E658DF8-B8C0-4C7F-85EB-B53A2DDD44A9}" type="datetimeFigureOut">
               <a:rPr lang="en-US" smtClean="0"/>
               <a:pPr/>
-              <a:t>8/12/2018</a:t>
+              <a:t>8/29/2018</a:t>
             </a:fld>
             <a:endParaRPr lang="en-US"/>
           </a:p>
@@ -2150,7 +2150,7 @@
             <a:fld id="{6E658DF8-B8C0-4C7F-85EB-B53A2DDD44A9}" type="datetimeFigureOut">
               <a:rPr lang="en-US" smtClean="0"/>
               <a:pPr/>
-              <a:t>8/12/2018</a:t>
+              <a:t>8/29/2018</a:t>
             </a:fld>
             <a:endParaRPr lang="en-US"/>
           </a:p>
@@ -2265,7 +2265,7 @@
             <a:fld id="{6E658DF8-B8C0-4C7F-85EB-B53A2DDD44A9}" type="datetimeFigureOut">
               <a:rPr lang="en-US" smtClean="0"/>
               <a:pPr/>
-              <a:t>8/12/2018</a:t>
+              <a:t>8/29/2018</a:t>
             </a:fld>
             <a:endParaRPr lang="en-US"/>
           </a:p>
@@ -2357,7 +2357,7 @@
             <a:fld id="{6E658DF8-B8C0-4C7F-85EB-B53A2DDD44A9}" type="datetimeFigureOut">
               <a:rPr lang="en-US" smtClean="0"/>
               <a:pPr/>
-              <a:t>8/12/2018</a:t>
+              <a:t>8/29/2018</a:t>
             </a:fld>
             <a:endParaRPr lang="en-US"/>
           </a:p>
@@ -2631,7 +2631,7 @@
             <a:fld id="{6E658DF8-B8C0-4C7F-85EB-B53A2DDD44A9}" type="datetimeFigureOut">
               <a:rPr lang="en-US" smtClean="0"/>
               <a:pPr/>
-              <a:t>8/12/2018</a:t>
+              <a:t>8/29/2018</a:t>
             </a:fld>
             <a:endParaRPr lang="en-US"/>
           </a:p>
@@ -2881,7 +2881,7 @@
             <a:fld id="{6E658DF8-B8C0-4C7F-85EB-B53A2DDD44A9}" type="datetimeFigureOut">
               <a:rPr lang="en-US" smtClean="0"/>
               <a:pPr/>
-              <a:t>8/12/2018</a:t>
+              <a:t>8/29/2018</a:t>
             </a:fld>
             <a:endParaRPr lang="en-US"/>
           </a:p>
@@ -3097,7 +3097,7 @@
             <a:fld id="{6E658DF8-B8C0-4C7F-85EB-B53A2DDD44A9}" type="datetimeFigureOut">
               <a:rPr lang="en-US" smtClean="0"/>
               <a:pPr/>
-              <a:t>8/12/2018</a:t>
+              <a:t>8/29/2018</a:t>
             </a:fld>
             <a:endParaRPr lang="en-US"/>
           </a:p>
@@ -7696,13 +7696,7 @@
               <a:rPr lang="en-US" dirty="0" smtClean="0">
                 <a:hlinkClick r:id="rId7"/>
               </a:rPr>
-              <a:t>http://</a:t>
-            </a:r>
-            <a:r>
-              <a:rPr lang="en-US" dirty="0" smtClean="0">
-                <a:hlinkClick r:id="rId7"/>
-              </a:rPr>
-              <a:t>www.cyber-dojo.org/review/show/QFYFdjNAkp?avatar=raccoon&amp;was_tag=36&amp;now_tag=37&amp;filename=undefined</a:t>
+              <a:t>http://www.cyber-dojo.org/review/show/QFYFdjNAkp?avatar=raccoon&amp;was_tag=36&amp;now_tag=37&amp;filename=undefined</a:t>
             </a:r>
             <a:endParaRPr lang="en-US" dirty="0"/>
           </a:p>
@@ -8153,8 +8147,17 @@
           <a:p>
             <a:r>
               <a:rPr lang="en-IN" dirty="0" smtClean="0"/>
-              <a:t>In java string is an object.</a:t>
+              <a:t>In java string is an </a:t>
             </a:r>
+            <a:r>
+              <a:rPr lang="en-IN" dirty="0" smtClean="0"/>
+              <a:t>object of </a:t>
+            </a:r>
+            <a:r>
+              <a:rPr lang="en-IN" smtClean="0"/>
+              <a:t>String class.</a:t>
+            </a:r>
+            <a:endParaRPr lang="en-IN" dirty="0" smtClean="0"/>
           </a:p>
           <a:p>
             <a:r>
@@ -8201,7 +8204,6 @@
               <a:rPr lang="en-IN" dirty="0" smtClean="0"/>
               <a:t>String Object.</a:t>
             </a:r>
-            <a:endParaRPr lang="en-IN" dirty="0" smtClean="0"/>
           </a:p>
           <a:p>
             <a:pPr lvl="1"/>
@@ -8882,11 +8884,7 @@
           <a:p>
             <a:r>
               <a:rPr lang="en-IN" dirty="0" smtClean="0"/>
-              <a:t>String </a:t>
-            </a:r>
-            <a:r>
-              <a:rPr lang="en-IN" dirty="0" smtClean="0"/>
-              <a:t>Literal </a:t>
+              <a:t>String Literal </a:t>
             </a:r>
             <a:r>
               <a:rPr lang="en-IN" dirty="0" err="1" smtClean="0"/>
@@ -9202,14 +9200,7 @@
                 <a:latin typeface="Cambria" pitchFamily="18" charset="0"/>
                 <a:ea typeface="Cambria" pitchFamily="18" charset="0"/>
               </a:rPr>
-              <a:t>= “Hello World</a:t>
-            </a:r>
-            <a:r>
-              <a:rPr lang="en-US" sz="2500" dirty="0" smtClean="0">
-                <a:latin typeface="Cambria" pitchFamily="18" charset="0"/>
-                <a:ea typeface="Cambria" pitchFamily="18" charset="0"/>
-              </a:rPr>
-              <a:t>”;</a:t>
+              <a:t>= “Hello World”;</a:t>
             </a:r>
           </a:p>
           <a:p>
@@ -9241,19 +9232,8 @@
                 <a:latin typeface="Cambria" pitchFamily="18" charset="0"/>
                 <a:ea typeface="Cambria" pitchFamily="18" charset="0"/>
               </a:rPr>
-              <a:t>= “</a:t>
+              <a:t>= “Welcome”;</a:t>
             </a:r>
-            <a:r>
-              <a:rPr lang="en-US" sz="2500" dirty="0" smtClean="0">
-                <a:latin typeface="Cambria" pitchFamily="18" charset="0"/>
-                <a:ea typeface="Cambria" pitchFamily="18" charset="0"/>
-              </a:rPr>
-              <a:t>Welcome”;</a:t>
-            </a:r>
-            <a:endParaRPr lang="en-US" sz="2500" dirty="0" smtClean="0">
-              <a:latin typeface="Cambria" pitchFamily="18" charset="0"/>
-              <a:ea typeface="Cambria" pitchFamily="18" charset="0"/>
-            </a:endParaRPr>
           </a:p>
         </p:txBody>
       </p:sp>

</xml_diff>